<commit_message>
updated slides and knowledge checks for 08-14, and 02
</commit_message>
<xml_diff>
--- a/slides/Online/2020/08  -  Classes.pptx
+++ b/slides/Online/2020/08  -  Classes.pptx
@@ -221,7 +221,7 @@
           <a:p>
             <a:fld id="{4D7E51A5-B478-1E40-8CBB-0DAA8831E99D}" type="datetimeFigureOut">
               <a:rPr lang="en-US" smtClean="0"/>
-              <a:t>3/15/20</a:t>
+              <a:t>4/8/20</a:t>
             </a:fld>
             <a:endParaRPr lang="en-US"/>
           </a:p>
@@ -386,7 +386,7 @@
           <a:p>
             <a:fld id="{D0ED587F-861E-6740-9643-E3DDAE89B8D6}" type="datetimeFigureOut">
               <a:rPr lang="en-US" smtClean="0"/>
-              <a:t>3/15/20</a:t>
+              <a:t>4/8/20</a:t>
             </a:fld>
             <a:endParaRPr lang="en-US"/>
           </a:p>
@@ -6773,8 +6773,8 @@
         </p:nvSpPr>
         <p:spPr>
           <a:xfrm>
-            <a:off x="628075" y="1463722"/>
-            <a:ext cx="12862147" cy="5735994"/>
+            <a:off x="568038" y="1463722"/>
+            <a:ext cx="8640103" cy="5068119"/>
           </a:xfrm>
         </p:spPr>
         <p:txBody>
@@ -6872,23 +6872,6 @@
             <a:r>
               <a:rPr lang="en-US" dirty="0"/>
               <a:t>He was inspired by the LISP programming language </a:t>
-            </a:r>
-          </a:p>
-          <a:p>
-            <a:pPr lvl="3"/>
-            <a:r>
-              <a:rPr lang="en-US" i="1" dirty="0"/>
-              <a:t>I thought of objects being like biological cells and/or individual computers on a network, only able to communicate with messages. – Alan Kay (</a:t>
-            </a:r>
-            <a:r>
-              <a:rPr lang="en-US" i="1" dirty="0">
-                <a:hlinkClick r:id="rId2"/>
-              </a:rPr>
-              <a:t>reference</a:t>
-            </a:r>
-            <a:r>
-              <a:rPr lang="en-US" i="1" dirty="0"/>
-              <a:t>)</a:t>
             </a:r>
           </a:p>
           <a:p>
@@ -6943,7 +6926,7 @@
               <a:rPr lang="en-US" sz="1400" dirty="0">
                 <a:latin typeface="Microsoft Sans Serif" panose="020B0604020202020204" pitchFamily="34" charset="0"/>
                 <a:cs typeface="Microsoft Sans Serif" panose="020B0604020202020204" pitchFamily="34" charset="0"/>
-                <a:hlinkClick r:id="rId3"/>
+                <a:hlinkClick r:id="rId2"/>
               </a:rPr>
               <a:t>https://medium.com/javascript-scene/the-forgotten-history-of-oop-88d71b9b2d9f</a:t>
             </a:r>
@@ -6951,6 +6934,76 @@
               <a:latin typeface="Microsoft Sans Serif" panose="020B0604020202020204" pitchFamily="34" charset="0"/>
               <a:cs typeface="Microsoft Sans Serif" panose="020B0604020202020204" pitchFamily="34" charset="0"/>
             </a:endParaRPr>
+          </a:p>
+        </p:txBody>
+      </p:sp>
+      <p:sp>
+        <p:nvSpPr>
+          <p:cNvPr id="2" name="Rectangle 1">
+            <a:extLst>
+              <a:ext uri="{FF2B5EF4-FFF2-40B4-BE49-F238E27FC236}">
+                <a16:creationId xmlns:a16="http://schemas.microsoft.com/office/drawing/2014/main" id="{E5C11D6F-C2AB-4E41-9AF9-02E9EF991109}"/>
+              </a:ext>
+            </a:extLst>
+          </p:cNvPr>
+          <p:cNvSpPr/>
+          <p:nvPr/>
+        </p:nvSpPr>
+        <p:spPr>
+          <a:xfrm>
+            <a:off x="8929511" y="2818081"/>
+            <a:ext cx="4809067" cy="1631216"/>
+          </a:xfrm>
+          <a:prstGeom prst="rect">
+            <a:avLst/>
+          </a:prstGeom>
+        </p:spPr>
+        <p:txBody>
+          <a:bodyPr wrap="square">
+            <a:spAutoFit/>
+          </a:bodyPr>
+          <a:lstStyle/>
+          <a:p>
+            <a:r>
+              <a:rPr lang="en-US" dirty="0">
+                <a:latin typeface="FangSong" panose="02010609060101010101" pitchFamily="49" charset="-122"/>
+                <a:ea typeface="FangSong" panose="02010609060101010101" pitchFamily="49" charset="-122"/>
+                <a:cs typeface="Microsoft Sans Serif" panose="020B0604020202020204" pitchFamily="34" charset="0"/>
+              </a:rPr>
+              <a:t>I thought of objects being like biological cells and/or individual computers on a network, only able to communicate with messages. </a:t>
+            </a:r>
+            <a:br>
+              <a:rPr lang="en-US" dirty="0">
+                <a:latin typeface="FangSong" panose="02010609060101010101" pitchFamily="49" charset="-122"/>
+                <a:ea typeface="FangSong" panose="02010609060101010101" pitchFamily="49" charset="-122"/>
+                <a:cs typeface="Microsoft Sans Serif" panose="020B0604020202020204" pitchFamily="34" charset="0"/>
+              </a:rPr>
+            </a:br>
+            <a:r>
+              <a:rPr lang="en-US" dirty="0">
+                <a:latin typeface="FangSong" panose="02010609060101010101" pitchFamily="49" charset="-122"/>
+                <a:ea typeface="FangSong" panose="02010609060101010101" pitchFamily="49" charset="-122"/>
+                <a:cs typeface="Microsoft Sans Serif" panose="020B0604020202020204" pitchFamily="34" charset="0"/>
+              </a:rPr>
+              <a:t>– Alan Kay (</a:t>
+            </a:r>
+            <a:r>
+              <a:rPr lang="en-US" dirty="0">
+                <a:latin typeface="FangSong" panose="02010609060101010101" pitchFamily="49" charset="-122"/>
+                <a:ea typeface="FangSong" panose="02010609060101010101" pitchFamily="49" charset="-122"/>
+                <a:cs typeface="Microsoft Sans Serif" panose="020B0604020202020204" pitchFamily="34" charset="0"/>
+                <a:hlinkClick r:id="rId3"/>
+              </a:rPr>
+              <a:t>reference</a:t>
+            </a:r>
+            <a:r>
+              <a:rPr lang="en-US" dirty="0">
+                <a:latin typeface="FangSong" panose="02010609060101010101" pitchFamily="49" charset="-122"/>
+                <a:ea typeface="FangSong" panose="02010609060101010101" pitchFamily="49" charset="-122"/>
+                <a:cs typeface="Microsoft Sans Serif" panose="020B0604020202020204" pitchFamily="34" charset="0"/>
+              </a:rPr>
+              <a:t>)</a:t>
+            </a:r>
           </a:p>
         </p:txBody>
       </p:sp>
@@ -7373,6 +7426,78 @@
           </a:p>
         </p:txBody>
       </p:sp>
+      <p:cxnSp>
+        <p:nvCxnSpPr>
+          <p:cNvPr id="5" name="Straight Connector 4">
+            <a:extLst>
+              <a:ext uri="{FF2B5EF4-FFF2-40B4-BE49-F238E27FC236}">
+                <a16:creationId xmlns:a16="http://schemas.microsoft.com/office/drawing/2014/main" id="{054590F0-8864-DA48-BAF6-0A57B44070CE}"/>
+              </a:ext>
+            </a:extLst>
+          </p:cNvPr>
+          <p:cNvCxnSpPr/>
+          <p:nvPr/>
+        </p:nvCxnSpPr>
+        <p:spPr>
+          <a:xfrm>
+            <a:off x="3973689" y="4323644"/>
+            <a:ext cx="530578" cy="0"/>
+          </a:xfrm>
+          <a:prstGeom prst="line">
+            <a:avLst/>
+          </a:prstGeom>
+        </p:spPr>
+        <p:style>
+          <a:lnRef idx="2">
+            <a:schemeClr val="accent1"/>
+          </a:lnRef>
+          <a:fillRef idx="0">
+            <a:schemeClr val="accent1"/>
+          </a:fillRef>
+          <a:effectRef idx="1">
+            <a:schemeClr val="accent1"/>
+          </a:effectRef>
+          <a:fontRef idx="minor">
+            <a:schemeClr val="tx1"/>
+          </a:fontRef>
+        </p:style>
+      </p:cxnSp>
+      <p:cxnSp>
+        <p:nvCxnSpPr>
+          <p:cNvPr id="8" name="Straight Connector 7">
+            <a:extLst>
+              <a:ext uri="{FF2B5EF4-FFF2-40B4-BE49-F238E27FC236}">
+                <a16:creationId xmlns:a16="http://schemas.microsoft.com/office/drawing/2014/main" id="{230A685B-F90D-F242-9284-3AB15330C4CC}"/>
+              </a:ext>
+            </a:extLst>
+          </p:cNvPr>
+          <p:cNvCxnSpPr/>
+          <p:nvPr/>
+        </p:nvCxnSpPr>
+        <p:spPr>
+          <a:xfrm>
+            <a:off x="3443111" y="4724399"/>
+            <a:ext cx="530578" cy="0"/>
+          </a:xfrm>
+          <a:prstGeom prst="line">
+            <a:avLst/>
+          </a:prstGeom>
+        </p:spPr>
+        <p:style>
+          <a:lnRef idx="2">
+            <a:schemeClr val="accent1"/>
+          </a:lnRef>
+          <a:fillRef idx="0">
+            <a:schemeClr val="accent1"/>
+          </a:fillRef>
+          <a:effectRef idx="1">
+            <a:schemeClr val="accent1"/>
+          </a:effectRef>
+          <a:fontRef idx="minor">
+            <a:schemeClr val="tx1"/>
+          </a:fontRef>
+        </p:style>
+      </p:cxnSp>
     </p:spTree>
     <p:extLst>
       <p:ext uri="{BB962C8B-B14F-4D97-AF65-F5344CB8AC3E}">
@@ -7395,6 +7520,216 @@
       </p:transition>
     </mc:Fallback>
   </mc:AlternateContent>
+  <p:timing>
+    <p:tnLst>
+      <p:par>
+        <p:cTn id="1" dur="indefinite" restart="never" nodeType="tmRoot">
+          <p:childTnLst>
+            <p:seq concurrent="1" nextAc="seek">
+              <p:cTn id="2" dur="indefinite" nodeType="mainSeq">
+                <p:childTnLst>
+                  <p:par>
+                    <p:cTn id="3" fill="hold">
+                      <p:stCondLst>
+                        <p:cond delay="indefinite"/>
+                      </p:stCondLst>
+                      <p:childTnLst>
+                        <p:par>
+                          <p:cTn id="4" fill="hold">
+                            <p:stCondLst>
+                              <p:cond delay="0"/>
+                            </p:stCondLst>
+                            <p:childTnLst>
+                              <p:par>
+                                <p:cTn id="5" presetID="55" presetClass="entr" presetSubtype="0" fill="hold" nodeType="clickEffect">
+                                  <p:stCondLst>
+                                    <p:cond delay="0"/>
+                                  </p:stCondLst>
+                                  <p:childTnLst>
+                                    <p:set>
+                                      <p:cBhvr>
+                                        <p:cTn id="6" dur="1" fill="hold">
+                                          <p:stCondLst>
+                                            <p:cond delay="0"/>
+                                          </p:stCondLst>
+                                        </p:cTn>
+                                        <p:tgtEl>
+                                          <p:spTgt spid="5"/>
+                                        </p:tgtEl>
+                                        <p:attrNameLst>
+                                          <p:attrName>style.visibility</p:attrName>
+                                        </p:attrNameLst>
+                                      </p:cBhvr>
+                                      <p:to>
+                                        <p:strVal val="visible"/>
+                                      </p:to>
+                                    </p:set>
+                                    <p:anim calcmode="lin" valueType="num">
+                                      <p:cBhvr>
+                                        <p:cTn id="7" dur="1000" fill="hold"/>
+                                        <p:tgtEl>
+                                          <p:spTgt spid="5"/>
+                                        </p:tgtEl>
+                                        <p:attrNameLst>
+                                          <p:attrName>ppt_w</p:attrName>
+                                        </p:attrNameLst>
+                                      </p:cBhvr>
+                                      <p:tavLst>
+                                        <p:tav tm="0">
+                                          <p:val>
+                                            <p:strVal val="#ppt_w*0.70"/>
+                                          </p:val>
+                                        </p:tav>
+                                        <p:tav tm="100000">
+                                          <p:val>
+                                            <p:strVal val="#ppt_w"/>
+                                          </p:val>
+                                        </p:tav>
+                                      </p:tavLst>
+                                    </p:anim>
+                                    <p:anim calcmode="lin" valueType="num">
+                                      <p:cBhvr>
+                                        <p:cTn id="8" dur="1000" fill="hold"/>
+                                        <p:tgtEl>
+                                          <p:spTgt spid="5"/>
+                                        </p:tgtEl>
+                                        <p:attrNameLst>
+                                          <p:attrName>ppt_h</p:attrName>
+                                        </p:attrNameLst>
+                                      </p:cBhvr>
+                                      <p:tavLst>
+                                        <p:tav tm="0">
+                                          <p:val>
+                                            <p:strVal val="#ppt_h"/>
+                                          </p:val>
+                                        </p:tav>
+                                        <p:tav tm="100000">
+                                          <p:val>
+                                            <p:strVal val="#ppt_h"/>
+                                          </p:val>
+                                        </p:tav>
+                                      </p:tavLst>
+                                    </p:anim>
+                                    <p:animEffect transition="in" filter="fade">
+                                      <p:cBhvr>
+                                        <p:cTn id="9" dur="1000"/>
+                                        <p:tgtEl>
+                                          <p:spTgt spid="5"/>
+                                        </p:tgtEl>
+                                      </p:cBhvr>
+                                    </p:animEffect>
+                                  </p:childTnLst>
+                                </p:cTn>
+                              </p:par>
+                              <p:par>
+                                <p:cTn id="10" presetID="55" presetClass="entr" presetSubtype="0" fill="hold" nodeType="withEffect">
+                                  <p:stCondLst>
+                                    <p:cond delay="0"/>
+                                  </p:stCondLst>
+                                  <p:childTnLst>
+                                    <p:set>
+                                      <p:cBhvr>
+                                        <p:cTn id="11" dur="1" fill="hold">
+                                          <p:stCondLst>
+                                            <p:cond delay="0"/>
+                                          </p:stCondLst>
+                                        </p:cTn>
+                                        <p:tgtEl>
+                                          <p:spTgt spid="8"/>
+                                        </p:tgtEl>
+                                        <p:attrNameLst>
+                                          <p:attrName>style.visibility</p:attrName>
+                                        </p:attrNameLst>
+                                      </p:cBhvr>
+                                      <p:to>
+                                        <p:strVal val="visible"/>
+                                      </p:to>
+                                    </p:set>
+                                    <p:anim calcmode="lin" valueType="num">
+                                      <p:cBhvr>
+                                        <p:cTn id="12" dur="1000" fill="hold"/>
+                                        <p:tgtEl>
+                                          <p:spTgt spid="8"/>
+                                        </p:tgtEl>
+                                        <p:attrNameLst>
+                                          <p:attrName>ppt_w</p:attrName>
+                                        </p:attrNameLst>
+                                      </p:cBhvr>
+                                      <p:tavLst>
+                                        <p:tav tm="0">
+                                          <p:val>
+                                            <p:strVal val="#ppt_w*0.70"/>
+                                          </p:val>
+                                        </p:tav>
+                                        <p:tav tm="100000">
+                                          <p:val>
+                                            <p:strVal val="#ppt_w"/>
+                                          </p:val>
+                                        </p:tav>
+                                      </p:tavLst>
+                                    </p:anim>
+                                    <p:anim calcmode="lin" valueType="num">
+                                      <p:cBhvr>
+                                        <p:cTn id="13" dur="1000" fill="hold"/>
+                                        <p:tgtEl>
+                                          <p:spTgt spid="8"/>
+                                        </p:tgtEl>
+                                        <p:attrNameLst>
+                                          <p:attrName>ppt_h</p:attrName>
+                                        </p:attrNameLst>
+                                      </p:cBhvr>
+                                      <p:tavLst>
+                                        <p:tav tm="0">
+                                          <p:val>
+                                            <p:strVal val="#ppt_h"/>
+                                          </p:val>
+                                        </p:tav>
+                                        <p:tav tm="100000">
+                                          <p:val>
+                                            <p:strVal val="#ppt_h"/>
+                                          </p:val>
+                                        </p:tav>
+                                      </p:tavLst>
+                                    </p:anim>
+                                    <p:animEffect transition="in" filter="fade">
+                                      <p:cBhvr>
+                                        <p:cTn id="14" dur="1000"/>
+                                        <p:tgtEl>
+                                          <p:spTgt spid="8"/>
+                                        </p:tgtEl>
+                                      </p:cBhvr>
+                                    </p:animEffect>
+                                  </p:childTnLst>
+                                </p:cTn>
+                              </p:par>
+                            </p:childTnLst>
+                          </p:cTn>
+                        </p:par>
+                      </p:childTnLst>
+                    </p:cTn>
+                  </p:par>
+                </p:childTnLst>
+              </p:cTn>
+              <p:prevCondLst>
+                <p:cond evt="onPrev" delay="0">
+                  <p:tgtEl>
+                    <p:sldTgt/>
+                  </p:tgtEl>
+                </p:cond>
+              </p:prevCondLst>
+              <p:nextCondLst>
+                <p:cond evt="onNext" delay="0">
+                  <p:tgtEl>
+                    <p:sldTgt/>
+                  </p:tgtEl>
+                </p:cond>
+              </p:nextCondLst>
+            </p:seq>
+          </p:childTnLst>
+        </p:cTn>
+      </p:par>
+    </p:tnLst>
+  </p:timing>
 </p:sld>
 </file>
 
@@ -7462,7 +7797,7 @@
         <p:spPr>
           <a:xfrm>
             <a:off x="628075" y="1776683"/>
-            <a:ext cx="7601525" cy="4567673"/>
+            <a:ext cx="7601525" cy="5281318"/>
           </a:xfrm>
         </p:spPr>
         <p:txBody>
@@ -7499,7 +7834,7 @@
             <a:pPr lvl="2"/>
             <a:r>
               <a:rPr lang="en-US" dirty="0"/>
-              <a:t>May be instance (no-static)</a:t>
+              <a:t>May be instance (not-static)</a:t>
             </a:r>
           </a:p>
           <a:p>
@@ -7560,7 +7895,7 @@
         </p:nvSpPr>
         <p:spPr>
           <a:xfrm>
-            <a:off x="8342489" y="3152578"/>
+            <a:off x="8342489" y="2628226"/>
             <a:ext cx="4847036" cy="1600438"/>
           </a:xfrm>
           <a:prstGeom prst="rect">
@@ -7665,7 +8000,7 @@
         </p:nvSpPr>
         <p:spPr>
           <a:xfrm rot="20261789">
-            <a:off x="8413113" y="2475402"/>
+            <a:off x="8238238" y="1545894"/>
             <a:ext cx="648904" cy="1095022"/>
           </a:xfrm>
           <a:prstGeom prst="downArrow">
@@ -7720,7 +8055,7 @@
         </p:nvSpPr>
         <p:spPr>
           <a:xfrm>
-            <a:off x="8003822" y="1988074"/>
+            <a:off x="8786280" y="1439430"/>
             <a:ext cx="2923822" cy="523220"/>
           </a:xfrm>
           <a:prstGeom prst="rect">
@@ -7755,7 +8090,7 @@
         </p:nvSpPr>
         <p:spPr>
           <a:xfrm rot="10800000">
-            <a:off x="9692340" y="4323569"/>
+            <a:off x="9692340" y="3799217"/>
             <a:ext cx="648904" cy="1095022"/>
           </a:xfrm>
           <a:prstGeom prst="downArrow">
@@ -7810,7 +8145,7 @@
         </p:nvSpPr>
         <p:spPr>
           <a:xfrm>
-            <a:off x="9605433" y="5588758"/>
+            <a:off x="9605433" y="5064406"/>
             <a:ext cx="2065867" cy="307777"/>
           </a:xfrm>
           <a:prstGeom prst="rect">
@@ -7845,7 +8180,7 @@
         </p:nvSpPr>
         <p:spPr>
           <a:xfrm rot="6517799">
-            <a:off x="11425890" y="3893315"/>
+            <a:off x="11425890" y="3368963"/>
             <a:ext cx="648904" cy="1095022"/>
           </a:xfrm>
           <a:prstGeom prst="downArrow">
@@ -7900,7 +8235,7 @@
         </p:nvSpPr>
         <p:spPr>
           <a:xfrm>
-            <a:off x="11829384" y="4871080"/>
+            <a:off x="11829384" y="4346728"/>
             <a:ext cx="1360141" cy="738664"/>
           </a:xfrm>
           <a:prstGeom prst="rect">
@@ -8416,8 +8751,8 @@
         </p:nvSpPr>
         <p:spPr>
           <a:xfrm>
-            <a:off x="8376356" y="1964267"/>
-            <a:ext cx="4933244" cy="4616648"/>
+            <a:off x="8365067" y="1793319"/>
+            <a:ext cx="4933244" cy="3323987"/>
           </a:xfrm>
           <a:prstGeom prst="rect">
             <a:avLst/>
@@ -8464,12 +8799,6 @@
             </a:r>
           </a:p>
           <a:p>
-            <a:endParaRPr lang="en-US" sz="1400" dirty="0">
-              <a:latin typeface="Consolas" panose="020B0609020204030204" pitchFamily="49" charset="0"/>
-              <a:cs typeface="Consolas" panose="020B0609020204030204" pitchFamily="49" charset="0"/>
-            </a:endParaRPr>
-          </a:p>
-          <a:p>
             <a:r>
               <a:rPr lang="en-US" sz="1400" dirty="0">
                 <a:latin typeface="Consolas" panose="020B0609020204030204" pitchFamily="49" charset="0"/>
@@ -8511,12 +8840,6 @@
             </a:r>
           </a:p>
           <a:p>
-            <a:endParaRPr lang="en-US" sz="1400" dirty="0">
-              <a:latin typeface="Consolas" panose="020B0609020204030204" pitchFamily="49" charset="0"/>
-              <a:cs typeface="Consolas" panose="020B0609020204030204" pitchFamily="49" charset="0"/>
-            </a:endParaRPr>
-          </a:p>
-          <a:p>
             <a:r>
               <a:rPr lang="en-US" sz="1400" dirty="0">
                 <a:latin typeface="Consolas" panose="020B0609020204030204" pitchFamily="49" charset="0"/>
@@ -8558,12 +8881,6 @@
             </a:r>
           </a:p>
           <a:p>
-            <a:endParaRPr lang="en-US" sz="1400" dirty="0">
-              <a:latin typeface="Consolas" panose="020B0609020204030204" pitchFamily="49" charset="0"/>
-              <a:cs typeface="Consolas" panose="020B0609020204030204" pitchFamily="49" charset="0"/>
-            </a:endParaRPr>
-          </a:p>
-          <a:p>
             <a:r>
               <a:rPr lang="en-US" sz="1400" dirty="0">
                 <a:latin typeface="Consolas" panose="020B0609020204030204" pitchFamily="49" charset="0"/>
@@ -8619,12 +8936,6 @@
             </a:r>
           </a:p>
           <a:p>
-            <a:endParaRPr lang="en-US" sz="1400" dirty="0">
-              <a:latin typeface="Consolas" panose="020B0609020204030204" pitchFamily="49" charset="0"/>
-              <a:cs typeface="Consolas" panose="020B0609020204030204" pitchFamily="49" charset="0"/>
-            </a:endParaRPr>
-          </a:p>
-          <a:p>
             <a:r>
               <a:rPr lang="en-US" sz="1400" dirty="0">
                 <a:latin typeface="Consolas" panose="020B0609020204030204" pitchFamily="49" charset="0"/>
@@ -8677,21 +8988,6 @@
                 <a:cs typeface="Consolas" panose="020B0609020204030204" pitchFamily="49" charset="0"/>
               </a:rPr>
               <a:t>    }</a:t>
-            </a:r>
-          </a:p>
-          <a:p>
-            <a:endParaRPr lang="en-US" sz="1400" dirty="0">
-              <a:latin typeface="Consolas" panose="020B0609020204030204" pitchFamily="49" charset="0"/>
-              <a:cs typeface="Consolas" panose="020B0609020204030204" pitchFamily="49" charset="0"/>
-            </a:endParaRPr>
-          </a:p>
-          <a:p>
-            <a:r>
-              <a:rPr lang="en-US" sz="1400" dirty="0">
-                <a:latin typeface="Consolas" panose="020B0609020204030204" pitchFamily="49" charset="0"/>
-                <a:cs typeface="Consolas" panose="020B0609020204030204" pitchFamily="49" charset="0"/>
-              </a:rPr>
-              <a:t>    </a:t>
             </a:r>
           </a:p>
           <a:p>
@@ -8794,7 +9090,7 @@
         <p:spPr>
           <a:xfrm>
             <a:off x="628075" y="1776683"/>
-            <a:ext cx="7487225" cy="3920112"/>
+            <a:ext cx="7487225" cy="3692357"/>
           </a:xfrm>
         </p:spPr>
         <p:txBody>
@@ -8852,10 +9148,11 @@
             <a:pPr lvl="1"/>
             <a:r>
               <a:rPr lang="en-US" dirty="0"/>
-              <a:t>Notice, the type is the class – so not put in there</a:t>
-            </a:r>
-          </a:p>
-          <a:p>
+              <a:t>Notice, the type is the class, so no need to put a type in there </a:t>
+            </a:r>
+          </a:p>
+          <a:p>
+            <a:pPr lvl="1"/>
             <a:r>
               <a:rPr lang="en-US" dirty="0"/>
               <a:t>Used often especially in classes that just contain data</a:t>
@@ -10225,7 +10522,7 @@
           <a:p>
             <a:r>
               <a:rPr lang="en-US" dirty="0"/>
-              <a:t>You  get to build your own LEGO blocks!</a:t>
+              <a:t>You get to build your own LEGO blocks!</a:t>
             </a:r>
           </a:p>
           <a:p>
@@ -10303,7 +10600,7 @@
         </p:nvSpPr>
         <p:spPr>
           <a:xfrm>
-            <a:off x="9006128" y="4343481"/>
+            <a:off x="9006128" y="448059"/>
             <a:ext cx="2387450" cy="854096"/>
           </a:xfrm>
           <a:prstGeom prst="rect">
@@ -10364,7 +10661,7 @@
         </p:nvSpPr>
         <p:spPr>
           <a:xfrm>
-            <a:off x="7210181" y="5315927"/>
+            <a:off x="7210181" y="1420505"/>
             <a:ext cx="1931670" cy="731520"/>
           </a:xfrm>
           <a:prstGeom prst="rect">
@@ -10425,7 +10722,7 @@
         </p:nvSpPr>
         <p:spPr>
           <a:xfrm>
-            <a:off x="9234018" y="5315927"/>
+            <a:off x="9234018" y="1420505"/>
             <a:ext cx="1931670" cy="731520"/>
           </a:xfrm>
           <a:prstGeom prst="rect">
@@ -10486,7 +10783,7 @@
         </p:nvSpPr>
         <p:spPr>
           <a:xfrm>
-            <a:off x="11257855" y="5315927"/>
+            <a:off x="11257855" y="1420505"/>
             <a:ext cx="1931670" cy="731520"/>
           </a:xfrm>
           <a:prstGeom prst="rect">
@@ -10547,7 +10844,7 @@
         </p:nvSpPr>
         <p:spPr>
           <a:xfrm>
-            <a:off x="9006127" y="6125717"/>
+            <a:off x="9006127" y="2230295"/>
             <a:ext cx="2387449" cy="817822"/>
           </a:xfrm>
           <a:prstGeom prst="rect">

</xml_diff>

<commit_message>
updates to 08-14 as part of recording session
</commit_message>
<xml_diff>
--- a/slides/Online/2020/08  -  Classes.pptx
+++ b/slides/Online/2020/08  -  Classes.pptx
@@ -221,7 +221,7 @@
           <a:p>
             <a:fld id="{4D7E51A5-B478-1E40-8CBB-0DAA8831E99D}" type="datetimeFigureOut">
               <a:rPr lang="en-US" smtClean="0"/>
-              <a:t>4/8/20</a:t>
+              <a:t>4/11/20</a:t>
             </a:fld>
             <a:endParaRPr lang="en-US"/>
           </a:p>
@@ -386,7 +386,7 @@
           <a:p>
             <a:fld id="{D0ED587F-861E-6740-9643-E3DDAE89B8D6}" type="datetimeFigureOut">
               <a:rPr lang="en-US" smtClean="0"/>
-              <a:t>4/8/20</a:t>
+              <a:t>4/11/20</a:t>
             </a:fld>
             <a:endParaRPr lang="en-US"/>
           </a:p>
@@ -4279,8 +4279,8 @@
         </p:blipFill>
         <p:spPr>
           <a:xfrm>
-            <a:off x="9827882" y="6733969"/>
-            <a:ext cx="3520440" cy="787424"/>
+            <a:off x="10549054" y="6812081"/>
+            <a:ext cx="3065627" cy="685695"/>
           </a:xfrm>
           <a:prstGeom prst="rect">
             <a:avLst/>
@@ -4301,7 +4301,7 @@
         </p:nvSpPr>
         <p:spPr>
           <a:xfrm>
-            <a:off x="10549054" y="7264322"/>
+            <a:off x="11116808" y="7220777"/>
             <a:ext cx="2497873" cy="276999"/>
           </a:xfrm>
           <a:prstGeom prst="rect">
@@ -4340,8 +4340,8 @@
         </p:nvSpPr>
         <p:spPr>
           <a:xfrm>
-            <a:off x="9287446" y="7508206"/>
-            <a:ext cx="4601311" cy="246221"/>
+            <a:off x="10549054" y="7497776"/>
+            <a:ext cx="3339703" cy="215444"/>
           </a:xfrm>
           <a:prstGeom prst="rect">
             <a:avLst/>
@@ -4362,7 +4362,7 @@
               </a:spcAft>
             </a:pPr>
             <a:r>
-              <a:rPr lang="en-US" sz="1000" b="0" i="0" u="none" strike="noStrike" dirty="0">
+              <a:rPr lang="en-US" sz="800" b="0" i="0" u="none" strike="noStrike" dirty="0">
                 <a:solidFill>
                   <a:srgbClr val="7F7F7F"/>
                 </a:solidFill>
@@ -4372,7 +4372,7 @@
               <a:t>Slides Originally Created by Albert Lionelle (</a:t>
             </a:r>
             <a:r>
-              <a:rPr lang="en-US" sz="1000" b="0" i="0" u="none" strike="noStrike" dirty="0" err="1">
+              <a:rPr lang="en-US" sz="800" b="0" i="0" u="none" strike="noStrike" dirty="0" err="1">
                 <a:solidFill>
                   <a:srgbClr val="7F7F7F"/>
                 </a:solidFill>
@@ -4382,7 +4382,7 @@
               <a:t>Albert.Lionelle@colostate.edu</a:t>
             </a:r>
             <a:r>
-              <a:rPr lang="en-US" sz="1000" b="0" i="0" u="none" strike="noStrike" dirty="0">
+              <a:rPr lang="en-US" sz="800" b="0" i="0" u="none" strike="noStrike" dirty="0">
                 <a:solidFill>
                   <a:srgbClr val="7F7F7F"/>
                 </a:solidFill>
@@ -4391,7 +4391,7 @@
               </a:rPr>
               <a:t>)</a:t>
             </a:r>
-            <a:endParaRPr lang="en-US" sz="1000" b="0" dirty="0">
+            <a:endParaRPr lang="en-US" sz="800" b="0" dirty="0">
               <a:solidFill>
                 <a:srgbClr val="7F7F7F"/>
               </a:solidFill>
@@ -8000,7 +8000,7 @@
         </p:nvSpPr>
         <p:spPr>
           <a:xfrm rot="20261789">
-            <a:off x="8238238" y="1545894"/>
+            <a:off x="8526004" y="1962651"/>
             <a:ext cx="648904" cy="1095022"/>
           </a:xfrm>
           <a:prstGeom prst="downArrow">
@@ -8055,7 +8055,7 @@
         </p:nvSpPr>
         <p:spPr>
           <a:xfrm>
-            <a:off x="8786280" y="1439430"/>
+            <a:off x="9002180" y="1688250"/>
             <a:ext cx="2923822" cy="523220"/>
           </a:xfrm>
           <a:prstGeom prst="rect">
@@ -10112,41 +10112,408 @@
         <p:spPr>
           <a:xfrm>
             <a:off x="6282328" y="5024779"/>
-            <a:ext cx="3179172" cy="1998321"/>
+            <a:ext cx="3179172" cy="1467453"/>
           </a:xfrm>
         </p:spPr>
         <p:txBody>
           <a:bodyPr/>
           <a:lstStyle/>
           <a:p>
-            <a:r>
-              <a:rPr lang="en-US" dirty="0"/>
-              <a:t>true</a:t>
-            </a:r>
-          </a:p>
-          <a:p>
-            <a:r>
-              <a:rPr lang="en-US" dirty="0"/>
-              <a:t>Chocolate</a:t>
-            </a:r>
-          </a:p>
-          <a:p>
-            <a:r>
-              <a:rPr lang="en-US" dirty="0"/>
-              <a:t>3.5</a:t>
-            </a:r>
-          </a:p>
-          <a:p>
-            <a:r>
-              <a:rPr lang="en-US" dirty="0"/>
-              <a:t>Coconut</a:t>
-            </a:r>
+            <a:endParaRPr lang="en-US" dirty="0"/>
+          </a:p>
+          <a:p>
+            <a:endParaRPr lang="en-US" dirty="0"/>
           </a:p>
           <a:p>
             <a:endParaRPr lang="en-US" dirty="0"/>
           </a:p>
         </p:txBody>
       </p:sp>
+      <p:cxnSp>
+        <p:nvCxnSpPr>
+          <p:cNvPr id="6" name="Straight Connector 5">
+            <a:extLst>
+              <a:ext uri="{FF2B5EF4-FFF2-40B4-BE49-F238E27FC236}">
+                <a16:creationId xmlns:a16="http://schemas.microsoft.com/office/drawing/2014/main" id="{F3DCD8AF-1311-CA4C-A819-590ED0DB2CAF}"/>
+              </a:ext>
+            </a:extLst>
+          </p:cNvPr>
+          <p:cNvCxnSpPr/>
+          <p:nvPr/>
+        </p:nvCxnSpPr>
+        <p:spPr>
+          <a:xfrm>
+            <a:off x="8286044" y="2573867"/>
+            <a:ext cx="1175456" cy="0"/>
+          </a:xfrm>
+          <a:prstGeom prst="line">
+            <a:avLst/>
+          </a:prstGeom>
+          <a:ln>
+            <a:solidFill>
+              <a:schemeClr val="accent4"/>
+            </a:solidFill>
+          </a:ln>
+        </p:spPr>
+        <p:style>
+          <a:lnRef idx="2">
+            <a:schemeClr val="accent1"/>
+          </a:lnRef>
+          <a:fillRef idx="0">
+            <a:schemeClr val="accent1"/>
+          </a:fillRef>
+          <a:effectRef idx="1">
+            <a:schemeClr val="accent1"/>
+          </a:effectRef>
+          <a:fontRef idx="minor">
+            <a:schemeClr val="tx1"/>
+          </a:fontRef>
+        </p:style>
+      </p:cxnSp>
+      <p:cxnSp>
+        <p:nvCxnSpPr>
+          <p:cNvPr id="8" name="Straight Connector 7">
+            <a:extLst>
+              <a:ext uri="{FF2B5EF4-FFF2-40B4-BE49-F238E27FC236}">
+                <a16:creationId xmlns:a16="http://schemas.microsoft.com/office/drawing/2014/main" id="{2AB07A16-0EE8-5642-8764-2B3EF8126BE0}"/>
+              </a:ext>
+            </a:extLst>
+          </p:cNvPr>
+          <p:cNvCxnSpPr/>
+          <p:nvPr/>
+        </p:nvCxnSpPr>
+        <p:spPr>
+          <a:xfrm>
+            <a:off x="8286044" y="3005667"/>
+            <a:ext cx="1175456" cy="0"/>
+          </a:xfrm>
+          <a:prstGeom prst="line">
+            <a:avLst/>
+          </a:prstGeom>
+          <a:ln>
+            <a:solidFill>
+              <a:schemeClr val="accent4"/>
+            </a:solidFill>
+          </a:ln>
+        </p:spPr>
+        <p:style>
+          <a:lnRef idx="2">
+            <a:schemeClr val="accent1"/>
+          </a:lnRef>
+          <a:fillRef idx="0">
+            <a:schemeClr val="accent1"/>
+          </a:fillRef>
+          <a:effectRef idx="1">
+            <a:schemeClr val="accent1"/>
+          </a:effectRef>
+          <a:fontRef idx="minor">
+            <a:schemeClr val="tx1"/>
+          </a:fontRef>
+        </p:style>
+      </p:cxnSp>
+      <p:cxnSp>
+        <p:nvCxnSpPr>
+          <p:cNvPr id="9" name="Straight Connector 8">
+            <a:extLst>
+              <a:ext uri="{FF2B5EF4-FFF2-40B4-BE49-F238E27FC236}">
+                <a16:creationId xmlns:a16="http://schemas.microsoft.com/office/drawing/2014/main" id="{C83E1942-ACA8-134E-96B2-FE44F50A59DF}"/>
+              </a:ext>
+            </a:extLst>
+          </p:cNvPr>
+          <p:cNvCxnSpPr/>
+          <p:nvPr/>
+        </p:nvCxnSpPr>
+        <p:spPr>
+          <a:xfrm>
+            <a:off x="8382000" y="3208867"/>
+            <a:ext cx="1175456" cy="0"/>
+          </a:xfrm>
+          <a:prstGeom prst="line">
+            <a:avLst/>
+          </a:prstGeom>
+          <a:ln>
+            <a:solidFill>
+              <a:schemeClr val="accent4"/>
+            </a:solidFill>
+          </a:ln>
+        </p:spPr>
+        <p:style>
+          <a:lnRef idx="2">
+            <a:schemeClr val="accent1"/>
+          </a:lnRef>
+          <a:fillRef idx="0">
+            <a:schemeClr val="accent1"/>
+          </a:fillRef>
+          <a:effectRef idx="1">
+            <a:schemeClr val="accent1"/>
+          </a:effectRef>
+          <a:fontRef idx="minor">
+            <a:schemeClr val="tx1"/>
+          </a:fontRef>
+        </p:style>
+      </p:cxnSp>
+      <p:cxnSp>
+        <p:nvCxnSpPr>
+          <p:cNvPr id="10" name="Straight Connector 9">
+            <a:extLst>
+              <a:ext uri="{FF2B5EF4-FFF2-40B4-BE49-F238E27FC236}">
+                <a16:creationId xmlns:a16="http://schemas.microsoft.com/office/drawing/2014/main" id="{F53F301F-CD09-C945-96AB-E74D42B31A5C}"/>
+              </a:ext>
+            </a:extLst>
+          </p:cNvPr>
+          <p:cNvCxnSpPr/>
+          <p:nvPr/>
+        </p:nvCxnSpPr>
+        <p:spPr>
+          <a:xfrm>
+            <a:off x="8382000" y="3639255"/>
+            <a:ext cx="1175456" cy="0"/>
+          </a:xfrm>
+          <a:prstGeom prst="line">
+            <a:avLst/>
+          </a:prstGeom>
+          <a:ln>
+            <a:solidFill>
+              <a:schemeClr val="accent4"/>
+            </a:solidFill>
+          </a:ln>
+        </p:spPr>
+        <p:style>
+          <a:lnRef idx="2">
+            <a:schemeClr val="accent1"/>
+          </a:lnRef>
+          <a:fillRef idx="0">
+            <a:schemeClr val="accent1"/>
+          </a:fillRef>
+          <a:effectRef idx="1">
+            <a:schemeClr val="accent1"/>
+          </a:effectRef>
+          <a:fontRef idx="minor">
+            <a:schemeClr val="tx1"/>
+          </a:fontRef>
+        </p:style>
+      </p:cxnSp>
+      <p:cxnSp>
+        <p:nvCxnSpPr>
+          <p:cNvPr id="11" name="Straight Connector 10">
+            <a:extLst>
+              <a:ext uri="{FF2B5EF4-FFF2-40B4-BE49-F238E27FC236}">
+                <a16:creationId xmlns:a16="http://schemas.microsoft.com/office/drawing/2014/main" id="{06CD8A60-CC38-A04D-9C96-47E27045A38D}"/>
+              </a:ext>
+            </a:extLst>
+          </p:cNvPr>
+          <p:cNvCxnSpPr/>
+          <p:nvPr/>
+        </p:nvCxnSpPr>
+        <p:spPr>
+          <a:xfrm>
+            <a:off x="8286044" y="3886200"/>
+            <a:ext cx="1175456" cy="0"/>
+          </a:xfrm>
+          <a:prstGeom prst="line">
+            <a:avLst/>
+          </a:prstGeom>
+          <a:ln>
+            <a:solidFill>
+              <a:schemeClr val="accent3"/>
+            </a:solidFill>
+          </a:ln>
+        </p:spPr>
+        <p:style>
+          <a:lnRef idx="2">
+            <a:schemeClr val="accent1"/>
+          </a:lnRef>
+          <a:fillRef idx="0">
+            <a:schemeClr val="accent1"/>
+          </a:fillRef>
+          <a:effectRef idx="1">
+            <a:schemeClr val="accent1"/>
+          </a:effectRef>
+          <a:fontRef idx="minor">
+            <a:schemeClr val="tx1"/>
+          </a:fontRef>
+        </p:style>
+      </p:cxnSp>
+      <p:sp>
+        <p:nvSpPr>
+          <p:cNvPr id="13" name="Rectangle 12">
+            <a:extLst>
+              <a:ext uri="{FF2B5EF4-FFF2-40B4-BE49-F238E27FC236}">
+                <a16:creationId xmlns:a16="http://schemas.microsoft.com/office/drawing/2014/main" id="{1F9910B5-FC84-6448-8C1F-F41DD8F11F9E}"/>
+              </a:ext>
+            </a:extLst>
+          </p:cNvPr>
+          <p:cNvSpPr/>
+          <p:nvPr/>
+        </p:nvSpPr>
+        <p:spPr>
+          <a:xfrm>
+            <a:off x="6908800" y="4830480"/>
+            <a:ext cx="625492" cy="400110"/>
+          </a:xfrm>
+          <a:prstGeom prst="rect">
+            <a:avLst/>
+          </a:prstGeom>
+        </p:spPr>
+        <p:txBody>
+          <a:bodyPr wrap="none">
+            <a:spAutoFit/>
+          </a:bodyPr>
+          <a:lstStyle/>
+          <a:p>
+            <a:r>
+              <a:rPr lang="en-US" dirty="0"/>
+              <a:t>true</a:t>
+            </a:r>
+          </a:p>
+        </p:txBody>
+      </p:sp>
+      <p:sp>
+        <p:nvSpPr>
+          <p:cNvPr id="14" name="Rectangle 13">
+            <a:extLst>
+              <a:ext uri="{FF2B5EF4-FFF2-40B4-BE49-F238E27FC236}">
+                <a16:creationId xmlns:a16="http://schemas.microsoft.com/office/drawing/2014/main" id="{A9585F3A-4A5D-8A41-BA7B-360A48CE62D6}"/>
+              </a:ext>
+            </a:extLst>
+          </p:cNvPr>
+          <p:cNvSpPr/>
+          <p:nvPr/>
+        </p:nvSpPr>
+        <p:spPr>
+          <a:xfrm>
+            <a:off x="6908800" y="5350006"/>
+            <a:ext cx="1340432" cy="400110"/>
+          </a:xfrm>
+          <a:prstGeom prst="rect">
+            <a:avLst/>
+          </a:prstGeom>
+        </p:spPr>
+        <p:txBody>
+          <a:bodyPr wrap="none">
+            <a:spAutoFit/>
+          </a:bodyPr>
+          <a:lstStyle/>
+          <a:p>
+            <a:r>
+              <a:rPr lang="en-US" dirty="0"/>
+              <a:t>Chocolate</a:t>
+            </a:r>
+          </a:p>
+        </p:txBody>
+      </p:sp>
+      <p:sp>
+        <p:nvSpPr>
+          <p:cNvPr id="15" name="Rectangle 14">
+            <a:extLst>
+              <a:ext uri="{FF2B5EF4-FFF2-40B4-BE49-F238E27FC236}">
+                <a16:creationId xmlns:a16="http://schemas.microsoft.com/office/drawing/2014/main" id="{7C8BE11E-6516-5D4A-A7D6-6AB6F4396F2A}"/>
+              </a:ext>
+            </a:extLst>
+          </p:cNvPr>
+          <p:cNvSpPr/>
+          <p:nvPr/>
+        </p:nvSpPr>
+        <p:spPr>
+          <a:xfrm>
+            <a:off x="6908800" y="5869532"/>
+            <a:ext cx="540533" cy="400110"/>
+          </a:xfrm>
+          <a:prstGeom prst="rect">
+            <a:avLst/>
+          </a:prstGeom>
+        </p:spPr>
+        <p:txBody>
+          <a:bodyPr wrap="none">
+            <a:spAutoFit/>
+          </a:bodyPr>
+          <a:lstStyle/>
+          <a:p>
+            <a:r>
+              <a:rPr lang="en-US" dirty="0"/>
+              <a:t>3.5</a:t>
+            </a:r>
+          </a:p>
+        </p:txBody>
+      </p:sp>
+      <p:sp>
+        <p:nvSpPr>
+          <p:cNvPr id="16" name="Rectangle 15">
+            <a:extLst>
+              <a:ext uri="{FF2B5EF4-FFF2-40B4-BE49-F238E27FC236}">
+                <a16:creationId xmlns:a16="http://schemas.microsoft.com/office/drawing/2014/main" id="{79AAD68A-F81F-2B4A-A7F9-B6BDAF2AB08B}"/>
+              </a:ext>
+            </a:extLst>
+          </p:cNvPr>
+          <p:cNvSpPr/>
+          <p:nvPr/>
+        </p:nvSpPr>
+        <p:spPr>
+          <a:xfrm>
+            <a:off x="6908800" y="6308678"/>
+            <a:ext cx="1140056" cy="400110"/>
+          </a:xfrm>
+          <a:prstGeom prst="rect">
+            <a:avLst/>
+          </a:prstGeom>
+        </p:spPr>
+        <p:txBody>
+          <a:bodyPr wrap="none">
+            <a:spAutoFit/>
+          </a:bodyPr>
+          <a:lstStyle/>
+          <a:p>
+            <a:r>
+              <a:rPr lang="en-US" dirty="0"/>
+              <a:t>Coconut</a:t>
+            </a:r>
+          </a:p>
+        </p:txBody>
+      </p:sp>
+      <p:cxnSp>
+        <p:nvCxnSpPr>
+          <p:cNvPr id="22" name="Straight Arrow Connector 21">
+            <a:extLst>
+              <a:ext uri="{FF2B5EF4-FFF2-40B4-BE49-F238E27FC236}">
+                <a16:creationId xmlns:a16="http://schemas.microsoft.com/office/drawing/2014/main" id="{DFA927BF-6202-044F-8780-103ED57EABF8}"/>
+              </a:ext>
+            </a:extLst>
+          </p:cNvPr>
+          <p:cNvCxnSpPr>
+            <a:cxnSpLocks/>
+          </p:cNvCxnSpPr>
+          <p:nvPr/>
+        </p:nvCxnSpPr>
+        <p:spPr>
+          <a:xfrm flipH="1">
+            <a:off x="8969728" y="3354855"/>
+            <a:ext cx="853140" cy="0"/>
+          </a:xfrm>
+          <a:prstGeom prst="straightConnector1">
+            <a:avLst/>
+          </a:prstGeom>
+          <a:ln>
+            <a:solidFill>
+              <a:schemeClr val="accent4"/>
+            </a:solidFill>
+            <a:tailEnd type="triangle"/>
+          </a:ln>
+        </p:spPr>
+        <p:style>
+          <a:lnRef idx="2">
+            <a:schemeClr val="accent1"/>
+          </a:lnRef>
+          <a:fillRef idx="0">
+            <a:schemeClr val="accent1"/>
+          </a:fillRef>
+          <a:effectRef idx="1">
+            <a:schemeClr val="accent1"/>
+          </a:effectRef>
+          <a:fontRef idx="minor">
+            <a:schemeClr val="tx1"/>
+          </a:fontRef>
+        </p:style>
+      </p:cxnSp>
     </p:spTree>
     <p:extLst>
       <p:ext uri="{BB962C8B-B14F-4D97-AF65-F5344CB8AC3E}">
@@ -10190,7 +10557,7 @@
                             </p:stCondLst>
                             <p:childTnLst>
                               <p:par>
-                                <p:cTn id="5" presetID="9" presetClass="entr" presetSubtype="0" fill="hold" grpId="0" nodeType="clickEffect">
+                                <p:cTn id="5" presetID="9" presetClass="entr" presetSubtype="0" fill="hold" nodeType="clickEffect">
                                   <p:stCondLst>
                                     <p:cond delay="0"/>
                                   </p:stCondLst>
@@ -10203,11 +10570,7 @@
                                           </p:stCondLst>
                                         </p:cTn>
                                         <p:tgtEl>
-                                          <p:spTgt spid="7">
-                                            <p:txEl>
-                                              <p:pRg st="0" end="0"/>
-                                            </p:txEl>
-                                          </p:spTgt>
+                                          <p:spTgt spid="6"/>
                                         </p:tgtEl>
                                         <p:attrNameLst>
                                           <p:attrName>style.visibility</p:attrName>
@@ -10221,11 +10584,51 @@
                                       <p:cBhvr>
                                         <p:cTn id="7" dur="500"/>
                                         <p:tgtEl>
-                                          <p:spTgt spid="7">
-                                            <p:txEl>
-                                              <p:pRg st="0" end="0"/>
-                                            </p:txEl>
-                                          </p:spTgt>
+                                          <p:spTgt spid="6"/>
+                                        </p:tgtEl>
+                                      </p:cBhvr>
+                                    </p:animEffect>
+                                  </p:childTnLst>
+                                </p:cTn>
+                              </p:par>
+                            </p:childTnLst>
+                          </p:cTn>
+                        </p:par>
+                        <p:par>
+                          <p:cTn id="8" fill="hold">
+                            <p:stCondLst>
+                              <p:cond delay="500"/>
+                            </p:stCondLst>
+                            <p:childTnLst>
+                              <p:par>
+                                <p:cTn id="9" presetID="9" presetClass="entr" presetSubtype="0" fill="hold" grpId="0" nodeType="afterEffect">
+                                  <p:stCondLst>
+                                    <p:cond delay="0"/>
+                                  </p:stCondLst>
+                                  <p:childTnLst>
+                                    <p:set>
+                                      <p:cBhvr>
+                                        <p:cTn id="10" dur="1" fill="hold">
+                                          <p:stCondLst>
+                                            <p:cond delay="0"/>
+                                          </p:stCondLst>
+                                        </p:cTn>
+                                        <p:tgtEl>
+                                          <p:spTgt spid="13"/>
+                                        </p:tgtEl>
+                                        <p:attrNameLst>
+                                          <p:attrName>style.visibility</p:attrName>
+                                        </p:attrNameLst>
+                                      </p:cBhvr>
+                                      <p:to>
+                                        <p:strVal val="visible"/>
+                                      </p:to>
+                                    </p:set>
+                                    <p:animEffect transition="in" filter="dissolve">
+                                      <p:cBhvr>
+                                        <p:cTn id="11" dur="500"/>
+                                        <p:tgtEl>
+                                          <p:spTgt spid="13"/>
                                         </p:tgtEl>
                                       </p:cBhvr>
                                     </p:animEffect>
@@ -10239,36 +10642,122 @@
                     </p:cTn>
                   </p:par>
                   <p:par>
-                    <p:cTn id="8" fill="hold">
+                    <p:cTn id="12" fill="hold">
                       <p:stCondLst>
                         <p:cond delay="indefinite"/>
                       </p:stCondLst>
                       <p:childTnLst>
                         <p:par>
-                          <p:cTn id="9" fill="hold">
+                          <p:cTn id="13" fill="hold">
                             <p:stCondLst>
                               <p:cond delay="0"/>
                             </p:stCondLst>
                             <p:childTnLst>
                               <p:par>
-                                <p:cTn id="10" presetID="9" presetClass="entr" presetSubtype="0" fill="hold" grpId="0" nodeType="clickEffect">
+                                <p:cTn id="14" presetID="53" presetClass="entr" presetSubtype="16" fill="hold" nodeType="clickEffect">
                                   <p:stCondLst>
                                     <p:cond delay="0"/>
                                   </p:stCondLst>
                                   <p:childTnLst>
                                     <p:set>
                                       <p:cBhvr>
-                                        <p:cTn id="11" dur="1" fill="hold">
+                                        <p:cTn id="15" dur="1" fill="hold">
                                           <p:stCondLst>
                                             <p:cond delay="0"/>
                                           </p:stCondLst>
                                         </p:cTn>
                                         <p:tgtEl>
-                                          <p:spTgt spid="7">
-                                            <p:txEl>
-                                              <p:pRg st="1" end="1"/>
-                                            </p:txEl>
-                                          </p:spTgt>
+                                          <p:spTgt spid="8"/>
+                                        </p:tgtEl>
+                                        <p:attrNameLst>
+                                          <p:attrName>style.visibility</p:attrName>
+                                        </p:attrNameLst>
+                                      </p:cBhvr>
+                                      <p:to>
+                                        <p:strVal val="visible"/>
+                                      </p:to>
+                                    </p:set>
+                                    <p:anim calcmode="lin" valueType="num">
+                                      <p:cBhvr>
+                                        <p:cTn id="16" dur="500" fill="hold"/>
+                                        <p:tgtEl>
+                                          <p:spTgt spid="8"/>
+                                        </p:tgtEl>
+                                        <p:attrNameLst>
+                                          <p:attrName>ppt_w</p:attrName>
+                                        </p:attrNameLst>
+                                      </p:cBhvr>
+                                      <p:tavLst>
+                                        <p:tav tm="0">
+                                          <p:val>
+                                            <p:fltVal val="0"/>
+                                          </p:val>
+                                        </p:tav>
+                                        <p:tav tm="100000">
+                                          <p:val>
+                                            <p:strVal val="#ppt_w"/>
+                                          </p:val>
+                                        </p:tav>
+                                      </p:tavLst>
+                                    </p:anim>
+                                    <p:anim calcmode="lin" valueType="num">
+                                      <p:cBhvr>
+                                        <p:cTn id="17" dur="500" fill="hold"/>
+                                        <p:tgtEl>
+                                          <p:spTgt spid="8"/>
+                                        </p:tgtEl>
+                                        <p:attrNameLst>
+                                          <p:attrName>ppt_h</p:attrName>
+                                        </p:attrNameLst>
+                                      </p:cBhvr>
+                                      <p:tavLst>
+                                        <p:tav tm="0">
+                                          <p:val>
+                                            <p:fltVal val="0"/>
+                                          </p:val>
+                                        </p:tav>
+                                        <p:tav tm="100000">
+                                          <p:val>
+                                            <p:strVal val="#ppt_h"/>
+                                          </p:val>
+                                        </p:tav>
+                                      </p:tavLst>
+                                    </p:anim>
+                                    <p:animEffect transition="in" filter="fade">
+                                      <p:cBhvr>
+                                        <p:cTn id="18" dur="500"/>
+                                        <p:tgtEl>
+                                          <p:spTgt spid="8"/>
+                                        </p:tgtEl>
+                                      </p:cBhvr>
+                                    </p:animEffect>
+                                  </p:childTnLst>
+                                </p:cTn>
+                              </p:par>
+                            </p:childTnLst>
+                          </p:cTn>
+                        </p:par>
+                        <p:par>
+                          <p:cTn id="19" fill="hold">
+                            <p:stCondLst>
+                              <p:cond delay="500"/>
+                            </p:stCondLst>
+                            <p:childTnLst>
+                              <p:par>
+                                <p:cTn id="20" presetID="9" presetClass="entr" presetSubtype="0" fill="hold" grpId="0" nodeType="afterEffect">
+                                  <p:stCondLst>
+                                    <p:cond delay="0"/>
+                                  </p:stCondLst>
+                                  <p:childTnLst>
+                                    <p:set>
+                                      <p:cBhvr>
+                                        <p:cTn id="21" dur="1" fill="hold">
+                                          <p:stCondLst>
+                                            <p:cond delay="0"/>
+                                          </p:stCondLst>
+                                        </p:cTn>
+                                        <p:tgtEl>
+                                          <p:spTgt spid="14"/>
                                         </p:tgtEl>
                                         <p:attrNameLst>
                                           <p:attrName>style.visibility</p:attrName>
@@ -10280,13 +10769,9 @@
                                     </p:set>
                                     <p:animEffect transition="in" filter="dissolve">
                                       <p:cBhvr>
-                                        <p:cTn id="12" dur="500"/>
+                                        <p:cTn id="22" dur="500"/>
                                         <p:tgtEl>
-                                          <p:spTgt spid="7">
-                                            <p:txEl>
-                                              <p:pRg st="1" end="1"/>
-                                            </p:txEl>
-                                          </p:spTgt>
+                                          <p:spTgt spid="14"/>
                                         </p:tgtEl>
                                       </p:cBhvr>
                                     </p:animEffect>
@@ -10300,36 +10785,122 @@
                     </p:cTn>
                   </p:par>
                   <p:par>
-                    <p:cTn id="13" fill="hold">
+                    <p:cTn id="23" fill="hold">
                       <p:stCondLst>
                         <p:cond delay="indefinite"/>
                       </p:stCondLst>
                       <p:childTnLst>
                         <p:par>
-                          <p:cTn id="14" fill="hold">
+                          <p:cTn id="24" fill="hold">
                             <p:stCondLst>
                               <p:cond delay="0"/>
                             </p:stCondLst>
                             <p:childTnLst>
                               <p:par>
-                                <p:cTn id="15" presetID="9" presetClass="entr" presetSubtype="0" fill="hold" grpId="0" nodeType="clickEffect">
+                                <p:cTn id="25" presetID="53" presetClass="entr" presetSubtype="16" fill="hold" nodeType="clickEffect">
                                   <p:stCondLst>
                                     <p:cond delay="0"/>
                                   </p:stCondLst>
                                   <p:childTnLst>
                                     <p:set>
                                       <p:cBhvr>
-                                        <p:cTn id="16" dur="1" fill="hold">
+                                        <p:cTn id="26" dur="1" fill="hold">
                                           <p:stCondLst>
                                             <p:cond delay="0"/>
                                           </p:stCondLst>
                                         </p:cTn>
                                         <p:tgtEl>
-                                          <p:spTgt spid="7">
-                                            <p:txEl>
-                                              <p:pRg st="2" end="2"/>
-                                            </p:txEl>
-                                          </p:spTgt>
+                                          <p:spTgt spid="9"/>
+                                        </p:tgtEl>
+                                        <p:attrNameLst>
+                                          <p:attrName>style.visibility</p:attrName>
+                                        </p:attrNameLst>
+                                      </p:cBhvr>
+                                      <p:to>
+                                        <p:strVal val="visible"/>
+                                      </p:to>
+                                    </p:set>
+                                    <p:anim calcmode="lin" valueType="num">
+                                      <p:cBhvr>
+                                        <p:cTn id="27" dur="500" fill="hold"/>
+                                        <p:tgtEl>
+                                          <p:spTgt spid="9"/>
+                                        </p:tgtEl>
+                                        <p:attrNameLst>
+                                          <p:attrName>ppt_w</p:attrName>
+                                        </p:attrNameLst>
+                                      </p:cBhvr>
+                                      <p:tavLst>
+                                        <p:tav tm="0">
+                                          <p:val>
+                                            <p:fltVal val="0"/>
+                                          </p:val>
+                                        </p:tav>
+                                        <p:tav tm="100000">
+                                          <p:val>
+                                            <p:strVal val="#ppt_w"/>
+                                          </p:val>
+                                        </p:tav>
+                                      </p:tavLst>
+                                    </p:anim>
+                                    <p:anim calcmode="lin" valueType="num">
+                                      <p:cBhvr>
+                                        <p:cTn id="28" dur="500" fill="hold"/>
+                                        <p:tgtEl>
+                                          <p:spTgt spid="9"/>
+                                        </p:tgtEl>
+                                        <p:attrNameLst>
+                                          <p:attrName>ppt_h</p:attrName>
+                                        </p:attrNameLst>
+                                      </p:cBhvr>
+                                      <p:tavLst>
+                                        <p:tav tm="0">
+                                          <p:val>
+                                            <p:fltVal val="0"/>
+                                          </p:val>
+                                        </p:tav>
+                                        <p:tav tm="100000">
+                                          <p:val>
+                                            <p:strVal val="#ppt_h"/>
+                                          </p:val>
+                                        </p:tav>
+                                      </p:tavLst>
+                                    </p:anim>
+                                    <p:animEffect transition="in" filter="fade">
+                                      <p:cBhvr>
+                                        <p:cTn id="29" dur="500"/>
+                                        <p:tgtEl>
+                                          <p:spTgt spid="9"/>
+                                        </p:tgtEl>
+                                      </p:cBhvr>
+                                    </p:animEffect>
+                                  </p:childTnLst>
+                                </p:cTn>
+                              </p:par>
+                            </p:childTnLst>
+                          </p:cTn>
+                        </p:par>
+                        <p:par>
+                          <p:cTn id="30" fill="hold">
+                            <p:stCondLst>
+                              <p:cond delay="500"/>
+                            </p:stCondLst>
+                            <p:childTnLst>
+                              <p:par>
+                                <p:cTn id="31" presetID="9" presetClass="entr" presetSubtype="0" fill="hold" grpId="0" nodeType="afterEffect">
+                                  <p:stCondLst>
+                                    <p:cond delay="0"/>
+                                  </p:stCondLst>
+                                  <p:childTnLst>
+                                    <p:set>
+                                      <p:cBhvr>
+                                        <p:cTn id="32" dur="1" fill="hold">
+                                          <p:stCondLst>
+                                            <p:cond delay="0"/>
+                                          </p:stCondLst>
+                                        </p:cTn>
+                                        <p:tgtEl>
+                                          <p:spTgt spid="15"/>
                                         </p:tgtEl>
                                         <p:attrNameLst>
                                           <p:attrName>style.visibility</p:attrName>
@@ -10341,13 +10912,9 @@
                                     </p:set>
                                     <p:animEffect transition="in" filter="dissolve">
                                       <p:cBhvr>
-                                        <p:cTn id="17" dur="500"/>
+                                        <p:cTn id="33" dur="500"/>
                                         <p:tgtEl>
-                                          <p:spTgt spid="7">
-                                            <p:txEl>
-                                              <p:pRg st="2" end="2"/>
-                                            </p:txEl>
-                                          </p:spTgt>
+                                          <p:spTgt spid="15"/>
                                         </p:tgtEl>
                                       </p:cBhvr>
                                     </p:animEffect>
@@ -10361,36 +10928,221 @@
                     </p:cTn>
                   </p:par>
                   <p:par>
-                    <p:cTn id="18" fill="hold">
+                    <p:cTn id="34" fill="hold">
                       <p:stCondLst>
                         <p:cond delay="indefinite"/>
                       </p:stCondLst>
                       <p:childTnLst>
                         <p:par>
-                          <p:cTn id="19" fill="hold">
+                          <p:cTn id="35" fill="hold">
                             <p:stCondLst>
                               <p:cond delay="0"/>
                             </p:stCondLst>
                             <p:childTnLst>
                               <p:par>
-                                <p:cTn id="20" presetID="9" presetClass="entr" presetSubtype="0" fill="hold" grpId="0" nodeType="clickEffect">
+                                <p:cTn id="36" presetID="53" presetClass="entr" presetSubtype="16" fill="hold" nodeType="clickEffect">
                                   <p:stCondLst>
                                     <p:cond delay="0"/>
                                   </p:stCondLst>
                                   <p:childTnLst>
                                     <p:set>
                                       <p:cBhvr>
-                                        <p:cTn id="21" dur="1" fill="hold">
+                                        <p:cTn id="37" dur="1" fill="hold">
                                           <p:stCondLst>
                                             <p:cond delay="0"/>
                                           </p:stCondLst>
                                         </p:cTn>
                                         <p:tgtEl>
-                                          <p:spTgt spid="7">
-                                            <p:txEl>
-                                              <p:pRg st="3" end="3"/>
-                                            </p:txEl>
-                                          </p:spTgt>
+                                          <p:spTgt spid="22"/>
+                                        </p:tgtEl>
+                                        <p:attrNameLst>
+                                          <p:attrName>style.visibility</p:attrName>
+                                        </p:attrNameLst>
+                                      </p:cBhvr>
+                                      <p:to>
+                                        <p:strVal val="visible"/>
+                                      </p:to>
+                                    </p:set>
+                                    <p:anim calcmode="lin" valueType="num">
+                                      <p:cBhvr>
+                                        <p:cTn id="38" dur="500" fill="hold"/>
+                                        <p:tgtEl>
+                                          <p:spTgt spid="22"/>
+                                        </p:tgtEl>
+                                        <p:attrNameLst>
+                                          <p:attrName>ppt_w</p:attrName>
+                                        </p:attrNameLst>
+                                      </p:cBhvr>
+                                      <p:tavLst>
+                                        <p:tav tm="0">
+                                          <p:val>
+                                            <p:fltVal val="0"/>
+                                          </p:val>
+                                        </p:tav>
+                                        <p:tav tm="100000">
+                                          <p:val>
+                                            <p:strVal val="#ppt_w"/>
+                                          </p:val>
+                                        </p:tav>
+                                      </p:tavLst>
+                                    </p:anim>
+                                    <p:anim calcmode="lin" valueType="num">
+                                      <p:cBhvr>
+                                        <p:cTn id="39" dur="500" fill="hold"/>
+                                        <p:tgtEl>
+                                          <p:spTgt spid="22"/>
+                                        </p:tgtEl>
+                                        <p:attrNameLst>
+                                          <p:attrName>ppt_h</p:attrName>
+                                        </p:attrNameLst>
+                                      </p:cBhvr>
+                                      <p:tavLst>
+                                        <p:tav tm="0">
+                                          <p:val>
+                                            <p:fltVal val="0"/>
+                                          </p:val>
+                                        </p:tav>
+                                        <p:tav tm="100000">
+                                          <p:val>
+                                            <p:strVal val="#ppt_h"/>
+                                          </p:val>
+                                        </p:tav>
+                                      </p:tavLst>
+                                    </p:anim>
+                                    <p:animEffect transition="in" filter="fade">
+                                      <p:cBhvr>
+                                        <p:cTn id="40" dur="500"/>
+                                        <p:tgtEl>
+                                          <p:spTgt spid="22"/>
+                                        </p:tgtEl>
+                                      </p:cBhvr>
+                                    </p:animEffect>
+                                  </p:childTnLst>
+                                </p:cTn>
+                              </p:par>
+                            </p:childTnLst>
+                          </p:cTn>
+                        </p:par>
+                      </p:childTnLst>
+                    </p:cTn>
+                  </p:par>
+                  <p:par>
+                    <p:cTn id="41" fill="hold">
+                      <p:stCondLst>
+                        <p:cond delay="indefinite"/>
+                      </p:stCondLst>
+                      <p:childTnLst>
+                        <p:par>
+                          <p:cTn id="42" fill="hold">
+                            <p:stCondLst>
+                              <p:cond delay="0"/>
+                            </p:stCondLst>
+                            <p:childTnLst>
+                              <p:par>
+                                <p:cTn id="43" presetID="53" presetClass="entr" presetSubtype="16" fill="hold" nodeType="clickEffect">
+                                  <p:stCondLst>
+                                    <p:cond delay="0"/>
+                                  </p:stCondLst>
+                                  <p:childTnLst>
+                                    <p:set>
+                                      <p:cBhvr>
+                                        <p:cTn id="44" dur="1" fill="hold">
+                                          <p:stCondLst>
+                                            <p:cond delay="0"/>
+                                          </p:stCondLst>
+                                        </p:cTn>
+                                        <p:tgtEl>
+                                          <p:spTgt spid="10"/>
+                                        </p:tgtEl>
+                                        <p:attrNameLst>
+                                          <p:attrName>style.visibility</p:attrName>
+                                        </p:attrNameLst>
+                                      </p:cBhvr>
+                                      <p:to>
+                                        <p:strVal val="visible"/>
+                                      </p:to>
+                                    </p:set>
+                                    <p:anim calcmode="lin" valueType="num">
+                                      <p:cBhvr>
+                                        <p:cTn id="45" dur="500" fill="hold"/>
+                                        <p:tgtEl>
+                                          <p:spTgt spid="10"/>
+                                        </p:tgtEl>
+                                        <p:attrNameLst>
+                                          <p:attrName>ppt_w</p:attrName>
+                                        </p:attrNameLst>
+                                      </p:cBhvr>
+                                      <p:tavLst>
+                                        <p:tav tm="0">
+                                          <p:val>
+                                            <p:fltVal val="0"/>
+                                          </p:val>
+                                        </p:tav>
+                                        <p:tav tm="100000">
+                                          <p:val>
+                                            <p:strVal val="#ppt_w"/>
+                                          </p:val>
+                                        </p:tav>
+                                      </p:tavLst>
+                                    </p:anim>
+                                    <p:anim calcmode="lin" valueType="num">
+                                      <p:cBhvr>
+                                        <p:cTn id="46" dur="500" fill="hold"/>
+                                        <p:tgtEl>
+                                          <p:spTgt spid="10"/>
+                                        </p:tgtEl>
+                                        <p:attrNameLst>
+                                          <p:attrName>ppt_h</p:attrName>
+                                        </p:attrNameLst>
+                                      </p:cBhvr>
+                                      <p:tavLst>
+                                        <p:tav tm="0">
+                                          <p:val>
+                                            <p:fltVal val="0"/>
+                                          </p:val>
+                                        </p:tav>
+                                        <p:tav tm="100000">
+                                          <p:val>
+                                            <p:strVal val="#ppt_h"/>
+                                          </p:val>
+                                        </p:tav>
+                                      </p:tavLst>
+                                    </p:anim>
+                                    <p:animEffect transition="in" filter="fade">
+                                      <p:cBhvr>
+                                        <p:cTn id="47" dur="500"/>
+                                        <p:tgtEl>
+                                          <p:spTgt spid="10"/>
+                                        </p:tgtEl>
+                                      </p:cBhvr>
+                                    </p:animEffect>
+                                  </p:childTnLst>
+                                </p:cTn>
+                              </p:par>
+                            </p:childTnLst>
+                          </p:cTn>
+                        </p:par>
+                        <p:par>
+                          <p:cTn id="48" fill="hold">
+                            <p:stCondLst>
+                              <p:cond delay="500"/>
+                            </p:stCondLst>
+                            <p:childTnLst>
+                              <p:par>
+                                <p:cTn id="49" presetID="9" presetClass="entr" presetSubtype="0" fill="hold" grpId="0" nodeType="afterEffect">
+                                  <p:stCondLst>
+                                    <p:cond delay="0"/>
+                                  </p:stCondLst>
+                                  <p:childTnLst>
+                                    <p:set>
+                                      <p:cBhvr>
+                                        <p:cTn id="50" dur="1" fill="hold">
+                                          <p:stCondLst>
+                                            <p:cond delay="0"/>
+                                          </p:stCondLst>
+                                        </p:cTn>
+                                        <p:tgtEl>
+                                          <p:spTgt spid="16"/>
                                         </p:tgtEl>
                                         <p:attrNameLst>
                                           <p:attrName>style.visibility</p:attrName>
@@ -10402,13 +11154,108 @@
                                     </p:set>
                                     <p:animEffect transition="in" filter="dissolve">
                                       <p:cBhvr>
-                                        <p:cTn id="22" dur="500"/>
+                                        <p:cTn id="51" dur="500"/>
                                         <p:tgtEl>
-                                          <p:spTgt spid="7">
-                                            <p:txEl>
-                                              <p:pRg st="3" end="3"/>
-                                            </p:txEl>
-                                          </p:spTgt>
+                                          <p:spTgt spid="16"/>
+                                        </p:tgtEl>
+                                      </p:cBhvr>
+                                    </p:animEffect>
+                                  </p:childTnLst>
+                                </p:cTn>
+                              </p:par>
+                            </p:childTnLst>
+                          </p:cTn>
+                        </p:par>
+                      </p:childTnLst>
+                    </p:cTn>
+                  </p:par>
+                  <p:par>
+                    <p:cTn id="52" fill="hold">
+                      <p:stCondLst>
+                        <p:cond delay="indefinite"/>
+                      </p:stCondLst>
+                      <p:childTnLst>
+                        <p:par>
+                          <p:cTn id="53" fill="hold">
+                            <p:stCondLst>
+                              <p:cond delay="0"/>
+                            </p:stCondLst>
+                            <p:childTnLst>
+                              <p:par>
+                                <p:cTn id="54" presetID="53" presetClass="entr" presetSubtype="16" fill="hold" nodeType="clickEffect">
+                                  <p:stCondLst>
+                                    <p:cond delay="0"/>
+                                  </p:stCondLst>
+                                  <p:childTnLst>
+                                    <p:set>
+                                      <p:cBhvr>
+                                        <p:cTn id="55" dur="1" fill="hold">
+                                          <p:stCondLst>
+                                            <p:cond delay="0"/>
+                                          </p:stCondLst>
+                                        </p:cTn>
+                                        <p:tgtEl>
+                                          <p:spTgt spid="11"/>
+                                        </p:tgtEl>
+                                        <p:attrNameLst>
+                                          <p:attrName>style.visibility</p:attrName>
+                                        </p:attrNameLst>
+                                      </p:cBhvr>
+                                      <p:to>
+                                        <p:strVal val="visible"/>
+                                      </p:to>
+                                    </p:set>
+                                    <p:anim calcmode="lin" valueType="num">
+                                      <p:cBhvr>
+                                        <p:cTn id="56" dur="500" fill="hold"/>
+                                        <p:tgtEl>
+                                          <p:spTgt spid="11"/>
+                                        </p:tgtEl>
+                                        <p:attrNameLst>
+                                          <p:attrName>ppt_w</p:attrName>
+                                        </p:attrNameLst>
+                                      </p:cBhvr>
+                                      <p:tavLst>
+                                        <p:tav tm="0">
+                                          <p:val>
+                                            <p:fltVal val="0"/>
+                                          </p:val>
+                                        </p:tav>
+                                        <p:tav tm="100000">
+                                          <p:val>
+                                            <p:strVal val="#ppt_w"/>
+                                          </p:val>
+                                        </p:tav>
+                                      </p:tavLst>
+                                    </p:anim>
+                                    <p:anim calcmode="lin" valueType="num">
+                                      <p:cBhvr>
+                                        <p:cTn id="57" dur="500" fill="hold"/>
+                                        <p:tgtEl>
+                                          <p:spTgt spid="11"/>
+                                        </p:tgtEl>
+                                        <p:attrNameLst>
+                                          <p:attrName>ppt_h</p:attrName>
+                                        </p:attrNameLst>
+                                      </p:cBhvr>
+                                      <p:tavLst>
+                                        <p:tav tm="0">
+                                          <p:val>
+                                            <p:fltVal val="0"/>
+                                          </p:val>
+                                        </p:tav>
+                                        <p:tav tm="100000">
+                                          <p:val>
+                                            <p:strVal val="#ppt_h"/>
+                                          </p:val>
+                                        </p:tav>
+                                      </p:tavLst>
+                                    </p:anim>
+                                    <p:animEffect transition="in" filter="fade">
+                                      <p:cBhvr>
+                                        <p:cTn id="58" dur="500"/>
+                                        <p:tgtEl>
+                                          <p:spTgt spid="11"/>
                                         </p:tgtEl>
                                       </p:cBhvr>
                                     </p:animEffect>
@@ -10443,7 +11290,10 @@
       </p:par>
     </p:tnLst>
     <p:bldLst>
-      <p:bldP spid="7" grpId="0" build="p"/>
+      <p:bldP spid="13" grpId="0"/>
+      <p:bldP spid="14" grpId="0"/>
+      <p:bldP spid="15" grpId="0"/>
+      <p:bldP spid="16" grpId="0"/>
     </p:bldLst>
   </p:timing>
 </p:sld>

</xml_diff>